<commit_message>
Mise à jour : modif présentation, suppression ancien backlog, ajout nouveau backlog et dossier HomeSkolar
</commit_message>
<xml_diff>
--- a/Maingaud_Bastien_Presentation_16062025.pptx
+++ b/Maingaud_Bastien_Presentation_16062025.pptx
@@ -8,6 +8,8 @@
     <p:sldId id="257" r:id="rId2"/>
     <p:sldId id="256" r:id="rId3"/>
     <p:sldId id="258" r:id="rId4"/>
+    <p:sldId id="259" r:id="rId5"/>
+    <p:sldId id="260" r:id="rId6"/>
   </p:sldIdLst>
   <p:sldSz cx="12192000" cy="6858000"/>
   <p:notesSz cx="6858000" cy="9144000"/>
@@ -106,7 +108,172 @@
       </a:defRPr>
     </a:lvl9pPr>
   </p:defaultTextStyle>
+  <p:extLst>
+    <p:ext uri="{EFAFB233-063F-42B5-8137-9DF3F51BA10A}">
+      <p15:sldGuideLst xmlns:p15="http://schemas.microsoft.com/office/powerpoint/2012/main"/>
+    </p:ext>
+  </p:extLst>
 </p:presentation>
+</file>
+
+<file path=ppt/revisionInfo.xml><?xml version="1.0" encoding="utf-8"?>
+<p1510:revInfo xmlns:a="http://schemas.openxmlformats.org/drawingml/2006/main" xmlns:r="http://schemas.openxmlformats.org/officeDocument/2006/relationships" xmlns:p1510="http://schemas.microsoft.com/office/powerpoint/2015/10/main">
+  <p1510:revLst>
+    <p1510:client id="{DD866E01-7A78-433D-9C1C-27706CC10FDB}" v="16" dt="2025-06-16T13:53:35.197"/>
+  </p1510:revLst>
+</p1510:revInfo>
+</file>
+
+<file path=ppt/changesInfos/changesInfo1.xml><?xml version="1.0" encoding="utf-8"?>
+<pc:chgInfo xmlns:a="http://schemas.openxmlformats.org/drawingml/2006/main" xmlns:r="http://schemas.openxmlformats.org/officeDocument/2006/relationships" xmlns:ac="http://schemas.microsoft.com/office/drawing/2013/main/command" xmlns:pc="http://schemas.microsoft.com/office/powerpoint/2013/main/command">
+  <pc:docChgLst>
+    <pc:chgData name="Bastien Maingaud" userId="b55486777f3bf841" providerId="LiveId" clId="{DD866E01-7A78-433D-9C1C-27706CC10FDB}"/>
+    <pc:docChg chg="undo custSel addSld delSld modSld sldOrd">
+      <pc:chgData name="Bastien Maingaud" userId="b55486777f3bf841" providerId="LiveId" clId="{DD866E01-7A78-433D-9C1C-27706CC10FDB}" dt="2025-06-16T13:57:44.172" v="201" actId="255"/>
+      <pc:docMkLst>
+        <pc:docMk/>
+      </pc:docMkLst>
+      <pc:sldChg chg="modTransition">
+        <pc:chgData name="Bastien Maingaud" userId="b55486777f3bf841" providerId="LiveId" clId="{DD866E01-7A78-433D-9C1C-27706CC10FDB}" dt="2025-06-16T13:49:45.598" v="46"/>
+        <pc:sldMkLst>
+          <pc:docMk/>
+          <pc:sldMk cId="78140410" sldId="256"/>
+        </pc:sldMkLst>
+      </pc:sldChg>
+      <pc:sldChg chg="modTransition">
+        <pc:chgData name="Bastien Maingaud" userId="b55486777f3bf841" providerId="LiveId" clId="{DD866E01-7A78-433D-9C1C-27706CC10FDB}" dt="2025-06-16T13:49:43.031" v="45"/>
+        <pc:sldMkLst>
+          <pc:docMk/>
+          <pc:sldMk cId="3269765821" sldId="257"/>
+        </pc:sldMkLst>
+      </pc:sldChg>
+      <pc:sldChg chg="addSp delSp modSp mod modTransition">
+        <pc:chgData name="Bastien Maingaud" userId="b55486777f3bf841" providerId="LiveId" clId="{DD866E01-7A78-433D-9C1C-27706CC10FDB}" dt="2025-06-16T13:57:44.172" v="201" actId="255"/>
+        <pc:sldMkLst>
+          <pc:docMk/>
+          <pc:sldMk cId="2277611056" sldId="258"/>
+        </pc:sldMkLst>
+        <pc:spChg chg="mod">
+          <ac:chgData name="Bastien Maingaud" userId="b55486777f3bf841" providerId="LiveId" clId="{DD866E01-7A78-433D-9C1C-27706CC10FDB}" dt="2025-06-16T13:57:44.172" v="201" actId="255"/>
+          <ac:spMkLst>
+            <pc:docMk/>
+            <pc:sldMk cId="2277611056" sldId="258"/>
+            <ac:spMk id="4" creationId="{5F5932C5-BD2E-E500-05B2-F8F76ADF3FB8}"/>
+          </ac:spMkLst>
+        </pc:spChg>
+        <pc:spChg chg="del mod">
+          <ac:chgData name="Bastien Maingaud" userId="b55486777f3bf841" providerId="LiveId" clId="{DD866E01-7A78-433D-9C1C-27706CC10FDB}" dt="2025-06-16T13:48:23.531" v="37"/>
+          <ac:spMkLst>
+            <pc:docMk/>
+            <pc:sldMk cId="2277611056" sldId="258"/>
+            <ac:spMk id="16" creationId="{189366D9-16B6-EF86-9B4F-B074497A2D5D}"/>
+          </ac:spMkLst>
+        </pc:spChg>
+        <pc:spChg chg="del mod">
+          <ac:chgData name="Bastien Maingaud" userId="b55486777f3bf841" providerId="LiveId" clId="{DD866E01-7A78-433D-9C1C-27706CC10FDB}" dt="2025-06-16T13:48:23.532" v="39"/>
+          <ac:spMkLst>
+            <pc:docMk/>
+            <pc:sldMk cId="2277611056" sldId="258"/>
+            <ac:spMk id="18" creationId="{14AD1CEE-6BB7-B1B6-6C65-97C51BF9B6D6}"/>
+          </ac:spMkLst>
+        </pc:spChg>
+        <pc:picChg chg="add mod">
+          <ac:chgData name="Bastien Maingaud" userId="b55486777f3bf841" providerId="LiveId" clId="{DD866E01-7A78-433D-9C1C-27706CC10FDB}" dt="2025-06-16T13:49:27.974" v="44" actId="1076"/>
+          <ac:picMkLst>
+            <pc:docMk/>
+            <pc:sldMk cId="2277611056" sldId="258"/>
+            <ac:picMk id="5" creationId="{B15B037B-DB4A-B3B9-2AF0-EDCFD24A68E8}"/>
+          </ac:picMkLst>
+        </pc:picChg>
+      </pc:sldChg>
+      <pc:sldChg chg="addSp delSp modSp new mod modTransition">
+        <pc:chgData name="Bastien Maingaud" userId="b55486777f3bf841" providerId="LiveId" clId="{DD866E01-7A78-433D-9C1C-27706CC10FDB}" dt="2025-06-16T13:55:33.667" v="176" actId="255"/>
+        <pc:sldMkLst>
+          <pc:docMk/>
+          <pc:sldMk cId="6001133" sldId="259"/>
+        </pc:sldMkLst>
+        <pc:spChg chg="mod">
+          <ac:chgData name="Bastien Maingaud" userId="b55486777f3bf841" providerId="LiveId" clId="{DD866E01-7A78-433D-9C1C-27706CC10FDB}" dt="2025-06-16T13:45:21.853" v="17" actId="1076"/>
+          <ac:spMkLst>
+            <pc:docMk/>
+            <pc:sldMk cId="6001133" sldId="259"/>
+            <ac:spMk id="2" creationId="{CC18FB0C-5887-0E14-A7BB-3A22D881D32E}"/>
+          </ac:spMkLst>
+        </pc:spChg>
+        <pc:spChg chg="del">
+          <ac:chgData name="Bastien Maingaud" userId="b55486777f3bf841" providerId="LiveId" clId="{DD866E01-7A78-433D-9C1C-27706CC10FDB}" dt="2025-06-16T13:45:02.825" v="14" actId="478"/>
+          <ac:spMkLst>
+            <pc:docMk/>
+            <pc:sldMk cId="6001133" sldId="259"/>
+            <ac:spMk id="3" creationId="{FB8EABB2-A5A0-5499-637D-FA6002E71605}"/>
+          </ac:spMkLst>
+        </pc:spChg>
+        <pc:spChg chg="mod">
+          <ac:chgData name="Bastien Maingaud" userId="b55486777f3bf841" providerId="LiveId" clId="{DD866E01-7A78-433D-9C1C-27706CC10FDB}" dt="2025-06-16T13:55:33.667" v="176" actId="255"/>
+          <ac:spMkLst>
+            <pc:docMk/>
+            <pc:sldMk cId="6001133" sldId="259"/>
+            <ac:spMk id="4" creationId="{39C2B1E5-F9C3-F83F-E128-F34704D5E683}"/>
+          </ac:spMkLst>
+        </pc:spChg>
+        <pc:picChg chg="add mod">
+          <ac:chgData name="Bastien Maingaud" userId="b55486777f3bf841" providerId="LiveId" clId="{DD866E01-7A78-433D-9C1C-27706CC10FDB}" dt="2025-06-16T13:48:15.273" v="33" actId="1076"/>
+          <ac:picMkLst>
+            <pc:docMk/>
+            <pc:sldMk cId="6001133" sldId="259"/>
+            <ac:picMk id="6" creationId="{B4C41667-93B9-0958-ADDE-461A0AA7F69E}"/>
+          </ac:picMkLst>
+        </pc:picChg>
+      </pc:sldChg>
+      <pc:sldChg chg="addSp delSp modSp new mod ord modTransition">
+        <pc:chgData name="Bastien Maingaud" userId="b55486777f3bf841" providerId="LiveId" clId="{DD866E01-7A78-433D-9C1C-27706CC10FDB}" dt="2025-06-16T13:55:03.252" v="169" actId="255"/>
+        <pc:sldMkLst>
+          <pc:docMk/>
+          <pc:sldMk cId="3289761411" sldId="260"/>
+        </pc:sldMkLst>
+        <pc:spChg chg="mod">
+          <ac:chgData name="Bastien Maingaud" userId="b55486777f3bf841" providerId="LiveId" clId="{DD866E01-7A78-433D-9C1C-27706CC10FDB}" dt="2025-06-16T13:45:40.532" v="23"/>
+          <ac:spMkLst>
+            <pc:docMk/>
+            <pc:sldMk cId="3289761411" sldId="260"/>
+            <ac:spMk id="2" creationId="{45A0A26D-77E7-129E-F226-2211E5152F54}"/>
+          </ac:spMkLst>
+        </pc:spChg>
+        <pc:spChg chg="del">
+          <ac:chgData name="Bastien Maingaud" userId="b55486777f3bf841" providerId="LiveId" clId="{DD866E01-7A78-433D-9C1C-27706CC10FDB}" dt="2025-06-16T13:46:35.385" v="26" actId="478"/>
+          <ac:spMkLst>
+            <pc:docMk/>
+            <pc:sldMk cId="3289761411" sldId="260"/>
+            <ac:spMk id="3" creationId="{024A4065-82C2-A53C-AE9E-09B48AF49E8C}"/>
+          </ac:spMkLst>
+        </pc:spChg>
+        <pc:spChg chg="mod">
+          <ac:chgData name="Bastien Maingaud" userId="b55486777f3bf841" providerId="LiveId" clId="{DD866E01-7A78-433D-9C1C-27706CC10FDB}" dt="2025-06-16T13:55:03.252" v="169" actId="255"/>
+          <ac:spMkLst>
+            <pc:docMk/>
+            <pc:sldMk cId="3289761411" sldId="260"/>
+            <ac:spMk id="4" creationId="{E51E2F06-FB1B-4FE9-FE5C-B466805E6BE7}"/>
+          </ac:spMkLst>
+        </pc:spChg>
+        <pc:picChg chg="add mod">
+          <ac:chgData name="Bastien Maingaud" userId="b55486777f3bf841" providerId="LiveId" clId="{DD866E01-7A78-433D-9C1C-27706CC10FDB}" dt="2025-06-16T13:46:49.720" v="29" actId="1076"/>
+          <ac:picMkLst>
+            <pc:docMk/>
+            <pc:sldMk cId="3289761411" sldId="260"/>
+            <ac:picMk id="6" creationId="{C2A6AAB5-1BA9-696A-7863-DB768CBAC9E9}"/>
+          </ac:picMkLst>
+        </pc:picChg>
+      </pc:sldChg>
+      <pc:sldChg chg="new del">
+        <pc:chgData name="Bastien Maingaud" userId="b55486777f3bf841" providerId="LiveId" clId="{DD866E01-7A78-433D-9C1C-27706CC10FDB}" dt="2025-06-16T13:50:03.833" v="50" actId="47"/>
+        <pc:sldMkLst>
+          <pc:docMk/>
+          <pc:sldMk cId="3916156794" sldId="261"/>
+        </pc:sldMkLst>
+      </pc:sldChg>
+    </pc:docChg>
+  </pc:docChgLst>
+</pc:chgInfo>
 </file>
 
 <file path=ppt/slideLayouts/slideLayout1.xml><?xml version="1.0" encoding="utf-8"?>
@@ -3903,6 +4070,18 @@
   <p:clrMapOvr>
     <a:masterClrMapping/>
   </p:clrMapOvr>
+  <mc:AlternateContent xmlns:mc="http://schemas.openxmlformats.org/markup-compatibility/2006">
+    <mc:Choice xmlns:p159="http://schemas.microsoft.com/office/powerpoint/2015/09/main" Requires="p159">
+      <p:transition xmlns:p14="http://schemas.microsoft.com/office/powerpoint/2010/main" spd="slow" p14:dur="2000">
+        <p159:morph option="byObject"/>
+      </p:transition>
+    </mc:Choice>
+    <mc:Fallback>
+      <p:transition spd="slow">
+        <p:fade/>
+      </p:transition>
+    </mc:Fallback>
+  </mc:AlternateContent>
 </p:sld>
 </file>
 
@@ -4672,6 +4851,18 @@
   <p:clrMapOvr>
     <a:masterClrMapping/>
   </p:clrMapOvr>
+  <mc:AlternateContent xmlns:mc="http://schemas.openxmlformats.org/markup-compatibility/2006">
+    <mc:Choice xmlns:p159="http://schemas.microsoft.com/office/powerpoint/2015/09/main" Requires="p159">
+      <p:transition xmlns:p14="http://schemas.microsoft.com/office/powerpoint/2010/main" spd="slow" p14:dur="2000">
+        <p159:morph option="byObject"/>
+      </p:transition>
+    </mc:Choice>
+    <mc:Fallback>
+      <p:transition spd="slow">
+        <p:fade/>
+      </p:transition>
+    </mc:Fallback>
+  </mc:AlternateContent>
 </p:sld>
 </file>
 
@@ -4747,18 +4938,18 @@
         <p:spPr>
           <a:xfrm>
             <a:off x="0" y="1939587"/>
-            <a:ext cx="3932237" cy="4570535"/>
+            <a:ext cx="3932237" cy="4817473"/>
           </a:xfrm>
         </p:spPr>
         <p:txBody>
           <a:bodyPr>
-            <a:normAutofit fontScale="85000" lnSpcReduction="20000"/>
+            <a:normAutofit fontScale="70000" lnSpcReduction="20000"/>
           </a:bodyPr>
           <a:lstStyle/>
           <a:p>
             <a:pPr algn="ctr"/>
             <a:r>
-              <a:rPr lang="fr-FR" sz="2100" b="1" dirty="0">
+              <a:rPr lang="fr-FR" sz="2600" b="1" dirty="0">
                 <a:cs typeface="Arial" panose="020B0604020202020204" pitchFamily="34" charset="0"/>
               </a:rPr>
               <a:t>Django (Python) – Le moteur du site</a:t>
@@ -4766,6 +4957,41 @@
           </a:p>
           <a:p>
             <a:endParaRPr lang="fr-FR" sz="1800" b="1" dirty="0">
+              <a:cs typeface="Arial" panose="020B0604020202020204" pitchFamily="34" charset="0"/>
+            </a:endParaRPr>
+          </a:p>
+          <a:p>
+            <a:pPr marL="342900" indent="-342900">
+              <a:buFont typeface="Arial" panose="020B0604020202020204" pitchFamily="34" charset="0"/>
+              <a:buChar char="•"/>
+            </a:pPr>
+            <a:r>
+              <a:rPr lang="fr-FR" sz="2600" b="1" dirty="0">
+                <a:cs typeface="Arial" panose="020B0604020202020204" pitchFamily="34" charset="0"/>
+              </a:rPr>
+              <a:t>Rôle</a:t>
+            </a:r>
+            <a:r>
+              <a:rPr lang="fr-FR" sz="2100" dirty="0">
+                <a:cs typeface="Arial" panose="020B0604020202020204" pitchFamily="34" charset="0"/>
+              </a:rPr>
+              <a:t> </a:t>
+            </a:r>
+            <a:r>
+              <a:rPr lang="fr-FR" sz="1700" dirty="0">
+                <a:cs typeface="Arial" panose="020B0604020202020204" pitchFamily="34" charset="0"/>
+              </a:rPr>
+              <a:t>: </a:t>
+            </a:r>
+            <a:r>
+              <a:rPr lang="fr-FR" sz="2300" dirty="0">
+                <a:cs typeface="Arial" panose="020B0604020202020204" pitchFamily="34" charset="0"/>
+              </a:rPr>
+              <a:t>cœur de l’application, exécute la logique côté serveur</a:t>
+            </a:r>
+          </a:p>
+          <a:p>
+            <a:endParaRPr lang="fr-FR" dirty="0">
               <a:cs typeface="Arial" panose="020B0604020202020204" pitchFamily="34" charset="0"/>
             </a:endParaRPr>
           </a:p>
@@ -4775,75 +5001,49 @@
               <a:buChar char="•"/>
             </a:pPr>
             <a:r>
-              <a:rPr lang="fr-FR" sz="2100" b="1" dirty="0">
+              <a:rPr lang="fr-FR" sz="2600" b="1" dirty="0">
                 <a:cs typeface="Arial" panose="020B0604020202020204" pitchFamily="34" charset="0"/>
               </a:rPr>
-              <a:t>Rôle</a:t>
-            </a:r>
-            <a:r>
-              <a:rPr lang="fr-FR" sz="2100" dirty="0">
+              <a:t>Gère</a:t>
+            </a:r>
+            <a:r>
+              <a:rPr lang="fr-FR" sz="2600" dirty="0">
                 <a:cs typeface="Arial" panose="020B0604020202020204" pitchFamily="34" charset="0"/>
               </a:rPr>
-              <a:t> </a:t>
-            </a:r>
-            <a:r>
-              <a:rPr lang="fr-FR" sz="1700" dirty="0">
-                <a:cs typeface="Arial" panose="020B0604020202020204" pitchFamily="34" charset="0"/>
-              </a:rPr>
-              <a:t>: </a:t>
-            </a:r>
-            <a:r>
-              <a:rPr lang="fr-FR" sz="1900" dirty="0">
-                <a:cs typeface="Arial" panose="020B0604020202020204" pitchFamily="34" charset="0"/>
-              </a:rPr>
-              <a:t>cœur de l’application, exécute la logique côté serveur</a:t>
-            </a:r>
-          </a:p>
-          <a:p>
-            <a:endParaRPr lang="fr-FR" dirty="0">
-              <a:cs typeface="Arial" panose="020B0604020202020204" pitchFamily="34" charset="0"/>
-            </a:endParaRPr>
-          </a:p>
-          <a:p>
-            <a:pPr marL="285750" indent="-285750">
+              <a:t> :</a:t>
+            </a:r>
+          </a:p>
+          <a:p>
+            <a:pPr marL="800100" lvl="1" indent="-342900">
               <a:buFont typeface="Arial" panose="020B0604020202020204" pitchFamily="34" charset="0"/>
               <a:buChar char="•"/>
             </a:pPr>
             <a:r>
-              <a:rPr lang="fr-FR" sz="2100" b="1" dirty="0">
-                <a:cs typeface="Arial" panose="020B0604020202020204" pitchFamily="34" charset="0"/>
-              </a:rPr>
-              <a:t>Gère</a:t>
-            </a:r>
-            <a:r>
-              <a:rPr lang="fr-FR" sz="2100" dirty="0">
-                <a:cs typeface="Arial" panose="020B0604020202020204" pitchFamily="34" charset="0"/>
-              </a:rPr>
-              <a:t> :</a:t>
-            </a:r>
-          </a:p>
-          <a:p>
-            <a:pPr lvl="1"/>
-            <a:r>
-              <a:rPr lang="fr-FR" sz="1900" dirty="0">
+              <a:rPr lang="fr-FR" sz="2300" dirty="0">
                 <a:cs typeface="Arial" panose="020B0604020202020204" pitchFamily="34" charset="0"/>
               </a:rPr>
               <a:t>Inscriptions &amp; connexions</a:t>
             </a:r>
           </a:p>
           <a:p>
-            <a:pPr lvl="1"/>
-            <a:r>
-              <a:rPr lang="fr-FR" sz="1900" dirty="0">
+            <a:pPr marL="800100" lvl="1" indent="-342900">
+              <a:buFont typeface="Arial" panose="020B0604020202020204" pitchFamily="34" charset="0"/>
+              <a:buChar char="•"/>
+            </a:pPr>
+            <a:r>
+              <a:rPr lang="fr-FR" sz="2300" dirty="0">
                 <a:cs typeface="Arial" panose="020B0604020202020204" pitchFamily="34" charset="0"/>
               </a:rPr>
               <a:t>Modélisation et gestion des données utilisateurs (élèves, tuteurs)</a:t>
             </a:r>
           </a:p>
           <a:p>
-            <a:pPr lvl="1"/>
-            <a:r>
-              <a:rPr lang="fr-FR" sz="1900" dirty="0">
+            <a:pPr marL="800100" lvl="1" indent="-342900">
+              <a:buFont typeface="Arial" panose="020B0604020202020204" pitchFamily="34" charset="0"/>
+              <a:buChar char="•"/>
+            </a:pPr>
+            <a:r>
+              <a:rPr lang="fr-FR" sz="2300" dirty="0">
                 <a:cs typeface="Arial" panose="020B0604020202020204" pitchFamily="34" charset="0"/>
               </a:rPr>
               <a:t>Envoi de messages et planification des rendez-vous</a:t>
@@ -4858,28 +5058,34 @@
               <a:buChar char="•"/>
             </a:pPr>
             <a:r>
-              <a:rPr lang="fr-FR" sz="2100" b="1" dirty="0">
+              <a:rPr lang="fr-FR" sz="2600" b="1" dirty="0">
                 <a:cs typeface="Arial" panose="020B0604020202020204" pitchFamily="34" charset="0"/>
               </a:rPr>
               <a:t>Pourquoi Django ?</a:t>
             </a:r>
-            <a:endParaRPr lang="fr-FR" sz="2100" dirty="0">
+            <a:endParaRPr lang="fr-FR" sz="2600" dirty="0">
               <a:cs typeface="Arial" panose="020B0604020202020204" pitchFamily="34" charset="0"/>
             </a:endParaRPr>
           </a:p>
           <a:p>
-            <a:pPr lvl="1"/>
-            <a:r>
-              <a:rPr lang="fr-FR" sz="1900" dirty="0">
+            <a:pPr marL="800100" lvl="1" indent="-342900">
+              <a:buFont typeface="Arial" panose="020B0604020202020204" pitchFamily="34" charset="0"/>
+              <a:buChar char="•"/>
+            </a:pPr>
+            <a:r>
+              <a:rPr lang="fr-FR" sz="2300" dirty="0">
                 <a:cs typeface="Arial" panose="020B0604020202020204" pitchFamily="34" charset="0"/>
               </a:rPr>
               <a:t>Framework mature, sécurisé et performant (utilisé par Instagram, Pinterest…)</a:t>
             </a:r>
           </a:p>
           <a:p>
-            <a:pPr lvl="1"/>
-            <a:r>
-              <a:rPr lang="fr-FR" sz="1900" dirty="0">
+            <a:pPr marL="800100" lvl="1" indent="-342900">
+              <a:buFont typeface="Arial" panose="020B0604020202020204" pitchFamily="34" charset="0"/>
+              <a:buChar char="•"/>
+            </a:pPr>
+            <a:r>
+              <a:rPr lang="fr-FR" sz="2300" dirty="0">
                 <a:cs typeface="Arial" panose="020B0604020202020204" pitchFamily="34" charset="0"/>
               </a:rPr>
               <a:t>Intègre automatiquement un espace d’administration (CRUD) pour que l’association gère facilement les comptes</a:t>
@@ -4890,312 +5096,36 @@
           </a:p>
         </p:txBody>
       </p:sp>
-      <p:sp>
-        <p:nvSpPr>
-          <p:cNvPr id="16" name="ZoneTexte 15">
-            <a:extLst>
-              <a:ext uri="{FF2B5EF4-FFF2-40B4-BE49-F238E27FC236}">
-                <a16:creationId xmlns:a16="http://schemas.microsoft.com/office/drawing/2014/main" id="{189366D9-16B6-EF86-9B4F-B074497A2D5D}"/>
-              </a:ext>
-            </a:extLst>
-          </p:cNvPr>
-          <p:cNvSpPr txBox="1"/>
+      <p:pic>
+        <p:nvPicPr>
+          <p:cNvPr id="5" name="Image 4">
+            <a:extLst>
+              <a:ext uri="{FF2B5EF4-FFF2-40B4-BE49-F238E27FC236}">
+                <a16:creationId xmlns:a16="http://schemas.microsoft.com/office/drawing/2014/main" id="{B15B037B-DB4A-B3B9-2AF0-EDCFD24A68E8}"/>
+              </a:ext>
+            </a:extLst>
+          </p:cNvPr>
+          <p:cNvPicPr>
+            <a:picLocks noChangeAspect="1"/>
+          </p:cNvPicPr>
           <p:nvPr/>
-        </p:nvSpPr>
+        </p:nvPicPr>
+        <p:blipFill>
+          <a:blip r:embed="rId2"/>
+          <a:stretch>
+            <a:fillRect/>
+          </a:stretch>
+        </p:blipFill>
         <p:spPr>
           <a:xfrm>
-            <a:off x="4023880" y="1854976"/>
-            <a:ext cx="4461516" cy="4739759"/>
+            <a:off x="6096000" y="2723536"/>
+            <a:ext cx="4957030" cy="1818967"/>
           </a:xfrm>
           <a:prstGeom prst="rect">
             <a:avLst/>
           </a:prstGeom>
-          <a:noFill/>
         </p:spPr>
-        <p:txBody>
-          <a:bodyPr wrap="square">
-            <a:spAutoFit/>
-          </a:bodyPr>
-          <a:lstStyle/>
-          <a:p>
-            <a:pPr algn="ctr"/>
-            <a:r>
-              <a:rPr lang="fr-FR" b="1" dirty="0"/>
-              <a:t>HTMX + Django </a:t>
-            </a:r>
-            <a:r>
-              <a:rPr lang="fr-FR" b="1" dirty="0" err="1"/>
-              <a:t>Templates</a:t>
-            </a:r>
-            <a:r>
-              <a:rPr lang="fr-FR" b="1" dirty="0"/>
-              <a:t> – L’interface utilisateur</a:t>
-            </a:r>
-          </a:p>
-          <a:p>
-            <a:endParaRPr lang="fr-FR" b="1" dirty="0"/>
-          </a:p>
-          <a:p>
-            <a:pPr marL="285750" indent="-285750">
-              <a:buFont typeface="Arial" panose="020B0604020202020204" pitchFamily="34" charset="0"/>
-              <a:buChar char="•"/>
-            </a:pPr>
-            <a:r>
-              <a:rPr lang="fr-FR" b="1" dirty="0"/>
-              <a:t>Rôle</a:t>
-            </a:r>
-            <a:r>
-              <a:rPr lang="fr-FR" dirty="0"/>
-              <a:t> : </a:t>
-            </a:r>
-            <a:r>
-              <a:rPr lang="fr-FR" sz="1600" dirty="0"/>
-              <a:t>rend les pages web (formulaires, chat, calendrier) et gère les interactions</a:t>
-            </a:r>
-          </a:p>
-          <a:p>
-            <a:endParaRPr lang="fr-FR" dirty="0"/>
-          </a:p>
-          <a:p>
-            <a:pPr marL="285750" indent="-285750">
-              <a:lnSpc>
-                <a:spcPct val="150000"/>
-              </a:lnSpc>
-              <a:buFont typeface="Arial" panose="020B0604020202020204" pitchFamily="34" charset="0"/>
-              <a:buChar char="•"/>
-            </a:pPr>
-            <a:r>
-              <a:rPr lang="fr-FR" b="1" dirty="0"/>
-              <a:t>Fonctionnalités</a:t>
-            </a:r>
-            <a:r>
-              <a:rPr lang="fr-FR" dirty="0"/>
-              <a:t> :</a:t>
-            </a:r>
-          </a:p>
-          <a:p>
-            <a:pPr lvl="1"/>
-            <a:r>
-              <a:rPr lang="fr-FR" sz="1600" dirty="0"/>
-              <a:t>Mises à jour “</a:t>
-            </a:r>
-            <a:r>
-              <a:rPr lang="fr-FR" sz="1600" dirty="0" err="1"/>
-              <a:t>in-page</a:t>
-            </a:r>
-            <a:r>
-              <a:rPr lang="fr-FR" sz="1600" dirty="0"/>
-              <a:t>” sans  rechargement complet </a:t>
-            </a:r>
-          </a:p>
-          <a:p>
-            <a:pPr lvl="1"/>
-            <a:r>
-              <a:rPr lang="fr-FR" sz="1600" dirty="0"/>
-              <a:t>Ajout de tâches, envoi de messages, affichage dynamique du planning</a:t>
-            </a:r>
-          </a:p>
-          <a:p>
-            <a:pPr lvl="1"/>
-            <a:endParaRPr lang="fr-FR" sz="1400" dirty="0"/>
-          </a:p>
-          <a:p>
-            <a:pPr marL="285750" indent="-285750">
-              <a:lnSpc>
-                <a:spcPct val="150000"/>
-              </a:lnSpc>
-              <a:buFont typeface="Arial" panose="020B0604020202020204" pitchFamily="34" charset="0"/>
-              <a:buChar char="•"/>
-            </a:pPr>
-            <a:r>
-              <a:rPr lang="fr-FR" b="1" dirty="0"/>
-              <a:t>Pourquoi ce choix ?</a:t>
-            </a:r>
-            <a:endParaRPr lang="fr-FR" dirty="0"/>
-          </a:p>
-          <a:p>
-            <a:pPr lvl="1"/>
-            <a:r>
-              <a:rPr lang="fr-FR" sz="1600" dirty="0"/>
-              <a:t>Plus léger et rapide à mettre en place que </a:t>
-            </a:r>
-            <a:r>
-              <a:rPr lang="fr-FR" sz="1600" dirty="0" err="1"/>
-              <a:t>React</a:t>
-            </a:r>
-            <a:r>
-              <a:rPr lang="fr-FR" sz="1600" dirty="0"/>
-              <a:t>/</a:t>
-            </a:r>
-            <a:r>
-              <a:rPr lang="fr-FR" sz="1600" dirty="0" err="1"/>
-              <a:t>Angular</a:t>
-            </a:r>
-            <a:endParaRPr lang="fr-FR" sz="1600" dirty="0"/>
-          </a:p>
-          <a:p>
-            <a:pPr lvl="1"/>
-            <a:r>
-              <a:rPr lang="fr-FR" sz="1600" dirty="0"/>
-              <a:t>Code plus simple à maintenir et à faire évoluer sur le long terme</a:t>
-            </a:r>
-          </a:p>
-        </p:txBody>
-      </p:sp>
-      <p:sp>
-        <p:nvSpPr>
-          <p:cNvPr id="18" name="ZoneTexte 17">
-            <a:extLst>
-              <a:ext uri="{FF2B5EF4-FFF2-40B4-BE49-F238E27FC236}">
-                <a16:creationId xmlns:a16="http://schemas.microsoft.com/office/drawing/2014/main" id="{14AD1CEE-6BB7-B1B6-6C65-97C51BF9B6D6}"/>
-              </a:ext>
-            </a:extLst>
-          </p:cNvPr>
-          <p:cNvSpPr txBox="1"/>
-          <p:nvPr/>
-        </p:nvSpPr>
-        <p:spPr>
-          <a:xfrm>
-            <a:off x="8485396" y="1844587"/>
-            <a:ext cx="3849107" cy="5139869"/>
-          </a:xfrm>
-          <a:prstGeom prst="rect">
-            <a:avLst/>
-          </a:prstGeom>
-          <a:noFill/>
-        </p:spPr>
-        <p:txBody>
-          <a:bodyPr wrap="square">
-            <a:spAutoFit/>
-          </a:bodyPr>
-          <a:lstStyle/>
-          <a:p>
-            <a:pPr algn="ctr">
-              <a:buNone/>
-            </a:pPr>
-            <a:r>
-              <a:rPr lang="fr-FR" b="1" dirty="0"/>
-              <a:t>PostgreSQL – La base de données</a:t>
-            </a:r>
-          </a:p>
-          <a:p>
-            <a:pPr>
-              <a:buNone/>
-            </a:pPr>
-            <a:endParaRPr lang="fr-FR" b="1" dirty="0"/>
-          </a:p>
-          <a:p>
-            <a:pPr>
-              <a:buFont typeface="Arial" panose="020B0604020202020204" pitchFamily="34" charset="0"/>
-              <a:buChar char="•"/>
-            </a:pPr>
-            <a:r>
-              <a:rPr lang="fr-FR" b="1" dirty="0"/>
-              <a:t>Rôle</a:t>
-            </a:r>
-            <a:r>
-              <a:rPr lang="fr-FR" dirty="0"/>
-              <a:t> : </a:t>
-            </a:r>
-            <a:r>
-              <a:rPr lang="fr-FR" sz="1600" dirty="0"/>
-              <a:t>stockage pérenne de toutes les informations</a:t>
-            </a:r>
-          </a:p>
-          <a:p>
-            <a:endParaRPr lang="fr-FR" dirty="0"/>
-          </a:p>
-          <a:p>
-            <a:pPr>
-              <a:buFont typeface="Arial" panose="020B0604020202020204" pitchFamily="34" charset="0"/>
-              <a:buChar char="•"/>
-            </a:pPr>
-            <a:r>
-              <a:rPr lang="fr-FR" b="1" dirty="0"/>
-              <a:t>Contenu</a:t>
-            </a:r>
-            <a:r>
-              <a:rPr lang="fr-FR" dirty="0"/>
-              <a:t> :</a:t>
-            </a:r>
-          </a:p>
-          <a:p>
-            <a:pPr marL="742950" lvl="1" indent="-285750">
-              <a:buFont typeface="Arial" panose="020B0604020202020204" pitchFamily="34" charset="0"/>
-              <a:buChar char="•"/>
-            </a:pPr>
-            <a:r>
-              <a:rPr lang="fr-FR" sz="1600" dirty="0"/>
-              <a:t>Comptes utilisateurs, profils et permissions</a:t>
-            </a:r>
-          </a:p>
-          <a:p>
-            <a:pPr marL="742950" lvl="1" indent="-285750">
-              <a:buFont typeface="Arial" panose="020B0604020202020204" pitchFamily="34" charset="0"/>
-              <a:buChar char="•"/>
-            </a:pPr>
-            <a:r>
-              <a:rPr lang="fr-FR" sz="1600" dirty="0"/>
-              <a:t>Messages échangés</a:t>
-            </a:r>
-          </a:p>
-          <a:p>
-            <a:pPr marL="742950" lvl="1" indent="-285750">
-              <a:buFont typeface="Arial" panose="020B0604020202020204" pitchFamily="34" charset="0"/>
-              <a:buChar char="•"/>
-            </a:pPr>
-            <a:r>
-              <a:rPr lang="fr-FR" sz="1600" dirty="0"/>
-              <a:t>Événements de calendrier (rendez-vous)</a:t>
-            </a:r>
-          </a:p>
-          <a:p>
-            <a:pPr marL="742950" lvl="1" indent="-285750">
-              <a:buFont typeface="Arial" panose="020B0604020202020204" pitchFamily="34" charset="0"/>
-              <a:buChar char="•"/>
-            </a:pPr>
-            <a:r>
-              <a:rPr lang="fr-FR" sz="1600" dirty="0"/>
-              <a:t>Tâches et rappels</a:t>
-            </a:r>
-          </a:p>
-          <a:p>
-            <a:pPr lvl="1"/>
-            <a:endParaRPr lang="fr-FR" dirty="0"/>
-          </a:p>
-          <a:p>
-            <a:pPr>
-              <a:buFont typeface="Arial" panose="020B0604020202020204" pitchFamily="34" charset="0"/>
-              <a:buChar char="•"/>
-            </a:pPr>
-            <a:r>
-              <a:rPr lang="fr-FR" b="1" dirty="0"/>
-              <a:t>Pourquoi PostgreSQL ?</a:t>
-            </a:r>
-            <a:endParaRPr lang="fr-FR" dirty="0"/>
-          </a:p>
-          <a:p>
-            <a:pPr marL="742950" lvl="1" indent="-285750">
-              <a:buFont typeface="Arial" panose="020B0604020202020204" pitchFamily="34" charset="0"/>
-              <a:buChar char="•"/>
-            </a:pPr>
-            <a:r>
-              <a:rPr lang="fr-FR" sz="1600" dirty="0"/>
-              <a:t>SGBD relationnel robuste et éprouvé en production</a:t>
-            </a:r>
-          </a:p>
-          <a:p>
-            <a:pPr marL="742950" lvl="1" indent="-285750">
-              <a:buFont typeface="Arial" panose="020B0604020202020204" pitchFamily="34" charset="0"/>
-              <a:buChar char="•"/>
-            </a:pPr>
-            <a:r>
-              <a:rPr lang="fr-FR" sz="1600" dirty="0"/>
-              <a:t>Excellente intégration avec Django (ORM puissant, migrations automatiques)</a:t>
-            </a:r>
-          </a:p>
-        </p:txBody>
-      </p:sp>
+      </p:pic>
     </p:spTree>
     <p:extLst>
       <p:ext uri="{BB962C8B-B14F-4D97-AF65-F5344CB8AC3E}">
@@ -5206,6 +5136,543 @@
   <p:clrMapOvr>
     <a:masterClrMapping/>
   </p:clrMapOvr>
+  <mc:AlternateContent xmlns:mc="http://schemas.openxmlformats.org/markup-compatibility/2006">
+    <mc:Choice xmlns:p159="http://schemas.microsoft.com/office/powerpoint/2015/09/main" Requires="p159">
+      <p:transition xmlns:p14="http://schemas.microsoft.com/office/powerpoint/2010/main" spd="slow" p14:dur="2000">
+        <p159:morph option="byObject"/>
+      </p:transition>
+    </mc:Choice>
+    <mc:Fallback>
+      <p:transition spd="slow">
+        <p:fade/>
+      </p:transition>
+    </mc:Fallback>
+  </mc:AlternateContent>
+</p:sld>
+</file>
+
+<file path=ppt/slides/slide4.xml><?xml version="1.0" encoding="utf-8"?>
+<p:sld xmlns:a="http://schemas.openxmlformats.org/drawingml/2006/main" xmlns:r="http://schemas.openxmlformats.org/officeDocument/2006/relationships" xmlns:p="http://schemas.openxmlformats.org/presentationml/2006/main">
+  <p:cSld>
+    <p:spTree>
+      <p:nvGrpSpPr>
+        <p:cNvPr id="1" name=""/>
+        <p:cNvGrpSpPr/>
+        <p:nvPr/>
+      </p:nvGrpSpPr>
+      <p:grpSpPr>
+        <a:xfrm>
+          <a:off x="0" y="0"/>
+          <a:ext cx="0" cy="0"/>
+          <a:chOff x="0" y="0"/>
+          <a:chExt cx="0" cy="0"/>
+        </a:xfrm>
+      </p:grpSpPr>
+      <p:sp>
+        <p:nvSpPr>
+          <p:cNvPr id="2" name="Titre 1">
+            <a:extLst>
+              <a:ext uri="{FF2B5EF4-FFF2-40B4-BE49-F238E27FC236}">
+                <a16:creationId xmlns:a16="http://schemas.microsoft.com/office/drawing/2014/main" id="{CC18FB0C-5887-0E14-A7BB-3A22D881D32E}"/>
+              </a:ext>
+            </a:extLst>
+          </p:cNvPr>
+          <p:cNvSpPr>
+            <a:spLocks noGrp="1"/>
+          </p:cNvSpPr>
+          <p:nvPr>
+            <p:ph type="title"/>
+          </p:nvPr>
+        </p:nvSpPr>
+        <p:spPr>
+          <a:xfrm>
+            <a:off x="848724" y="919316"/>
+            <a:ext cx="3932237" cy="1600200"/>
+          </a:xfrm>
+        </p:spPr>
+        <p:txBody>
+          <a:bodyPr>
+            <a:normAutofit fontScale="90000"/>
+          </a:bodyPr>
+          <a:lstStyle/>
+          <a:p>
+            <a:r>
+              <a:rPr lang="fr-FR" b="1" dirty="0"/>
+              <a:t>HTMX + Django </a:t>
+            </a:r>
+            <a:r>
+              <a:rPr lang="fr-FR" b="1" dirty="0" err="1"/>
+              <a:t>Templates</a:t>
+            </a:r>
+            <a:r>
+              <a:rPr lang="fr-FR" b="1" dirty="0"/>
+              <a:t> – L’interface utilisateur</a:t>
+            </a:r>
+            <a:br>
+              <a:rPr lang="fr-FR" b="1" dirty="0"/>
+            </a:br>
+            <a:br>
+              <a:rPr lang="fr-FR" b="1" dirty="0"/>
+            </a:br>
+            <a:endParaRPr lang="fr-FR" dirty="0"/>
+          </a:p>
+        </p:txBody>
+      </p:sp>
+      <p:sp>
+        <p:nvSpPr>
+          <p:cNvPr id="4" name="Espace réservé du texte 3">
+            <a:extLst>
+              <a:ext uri="{FF2B5EF4-FFF2-40B4-BE49-F238E27FC236}">
+                <a16:creationId xmlns:a16="http://schemas.microsoft.com/office/drawing/2014/main" id="{39C2B1E5-F9C3-F83F-E128-F34704D5E683}"/>
+              </a:ext>
+            </a:extLst>
+          </p:cNvPr>
+          <p:cNvSpPr>
+            <a:spLocks noGrp="1"/>
+          </p:cNvSpPr>
+          <p:nvPr>
+            <p:ph type="body" sz="half" idx="2"/>
+          </p:nvPr>
+        </p:nvSpPr>
+        <p:spPr>
+          <a:xfrm>
+            <a:off x="122033" y="2264747"/>
+            <a:ext cx="4853090" cy="3811588"/>
+          </a:xfrm>
+        </p:spPr>
+        <p:txBody>
+          <a:bodyPr>
+            <a:normAutofit fontScale="85000" lnSpcReduction="20000"/>
+          </a:bodyPr>
+          <a:lstStyle/>
+          <a:p>
+            <a:endParaRPr lang="fr-FR" b="1" dirty="0"/>
+          </a:p>
+          <a:p>
+            <a:pPr marL="285750" indent="-285750">
+              <a:buFont typeface="Arial" panose="020B0604020202020204" pitchFamily="34" charset="0"/>
+              <a:buChar char="•"/>
+            </a:pPr>
+            <a:r>
+              <a:rPr lang="fr-FR" sz="2100" b="1" dirty="0"/>
+              <a:t>Rôle</a:t>
+            </a:r>
+            <a:r>
+              <a:rPr lang="fr-FR" sz="2100" dirty="0"/>
+              <a:t> </a:t>
+            </a:r>
+            <a:r>
+              <a:rPr lang="fr-FR" dirty="0"/>
+              <a:t>:</a:t>
+            </a:r>
+            <a:r>
+              <a:rPr lang="fr-FR" sz="1900" dirty="0"/>
+              <a:t>rend les pages web (formulaires, chat,                          calendrier) et gère les interactions</a:t>
+            </a:r>
+          </a:p>
+          <a:p>
+            <a:endParaRPr lang="fr-FR" dirty="0"/>
+          </a:p>
+          <a:p>
+            <a:pPr marL="285750" indent="-285750">
+              <a:lnSpc>
+                <a:spcPct val="150000"/>
+              </a:lnSpc>
+              <a:buFont typeface="Arial" panose="020B0604020202020204" pitchFamily="34" charset="0"/>
+              <a:buChar char="•"/>
+            </a:pPr>
+            <a:r>
+              <a:rPr lang="fr-FR" sz="2100" b="1" dirty="0"/>
+              <a:t>Fonctionnalités</a:t>
+            </a:r>
+            <a:r>
+              <a:rPr lang="fr-FR" sz="2100" dirty="0"/>
+              <a:t> :</a:t>
+            </a:r>
+          </a:p>
+          <a:p>
+            <a:pPr marL="742950" lvl="1" indent="-285750">
+              <a:buFont typeface="Arial" panose="020B0604020202020204" pitchFamily="34" charset="0"/>
+              <a:buChar char="•"/>
+            </a:pPr>
+            <a:r>
+              <a:rPr lang="fr-FR" sz="1900" dirty="0"/>
+              <a:t>Mises à jour “</a:t>
+            </a:r>
+            <a:r>
+              <a:rPr lang="fr-FR" sz="1900" dirty="0" err="1"/>
+              <a:t>in-page</a:t>
+            </a:r>
+            <a:r>
+              <a:rPr lang="fr-FR" sz="1900" dirty="0"/>
+              <a:t>” sans  rechargement complet </a:t>
+            </a:r>
+          </a:p>
+          <a:p>
+            <a:pPr marL="742950" lvl="1" indent="-285750">
+              <a:buFont typeface="Arial" panose="020B0604020202020204" pitchFamily="34" charset="0"/>
+              <a:buChar char="•"/>
+            </a:pPr>
+            <a:r>
+              <a:rPr lang="fr-FR" sz="1900" dirty="0"/>
+              <a:t>Ajout de tâches, envoi de messages, affichage dynamique du planning</a:t>
+            </a:r>
+          </a:p>
+          <a:p>
+            <a:pPr marL="742950" lvl="1" indent="-285750">
+              <a:buFont typeface="Arial" panose="020B0604020202020204" pitchFamily="34" charset="0"/>
+              <a:buChar char="•"/>
+            </a:pPr>
+            <a:endParaRPr lang="fr-FR" dirty="0"/>
+          </a:p>
+          <a:p>
+            <a:pPr marL="285750" indent="-285750">
+              <a:lnSpc>
+                <a:spcPct val="150000"/>
+              </a:lnSpc>
+              <a:buFont typeface="Arial" panose="020B0604020202020204" pitchFamily="34" charset="0"/>
+              <a:buChar char="•"/>
+            </a:pPr>
+            <a:r>
+              <a:rPr lang="fr-FR" sz="2100" b="1" dirty="0"/>
+              <a:t>Pourquoi ce choix ?</a:t>
+            </a:r>
+            <a:endParaRPr lang="fr-FR" sz="2100" dirty="0"/>
+          </a:p>
+          <a:p>
+            <a:pPr marL="742950" lvl="1" indent="-285750">
+              <a:buFont typeface="Arial" panose="020B0604020202020204" pitchFamily="34" charset="0"/>
+              <a:buChar char="•"/>
+            </a:pPr>
+            <a:r>
+              <a:rPr lang="fr-FR" sz="1900" dirty="0"/>
+              <a:t>Plus léger et rapide à mettre en place que </a:t>
+            </a:r>
+            <a:r>
+              <a:rPr lang="fr-FR" sz="1900" dirty="0" err="1"/>
+              <a:t>React</a:t>
+            </a:r>
+            <a:r>
+              <a:rPr lang="fr-FR" sz="1900" dirty="0"/>
+              <a:t>/</a:t>
+            </a:r>
+            <a:r>
+              <a:rPr lang="fr-FR" sz="1900" dirty="0" err="1"/>
+              <a:t>Angular</a:t>
+            </a:r>
+            <a:endParaRPr lang="fr-FR" sz="1900" dirty="0"/>
+          </a:p>
+          <a:p>
+            <a:pPr marL="742950" lvl="1" indent="-285750">
+              <a:buFont typeface="Arial" panose="020B0604020202020204" pitchFamily="34" charset="0"/>
+              <a:buChar char="•"/>
+            </a:pPr>
+            <a:r>
+              <a:rPr lang="fr-FR" sz="1900" dirty="0"/>
+              <a:t>Code plus simple à maintenir et à faire évoluer sur le long terme</a:t>
+            </a:r>
+          </a:p>
+          <a:p>
+            <a:endParaRPr lang="fr-FR" dirty="0"/>
+          </a:p>
+        </p:txBody>
+      </p:sp>
+      <p:pic>
+        <p:nvPicPr>
+          <p:cNvPr id="6" name="Image 5">
+            <a:extLst>
+              <a:ext uri="{FF2B5EF4-FFF2-40B4-BE49-F238E27FC236}">
+                <a16:creationId xmlns:a16="http://schemas.microsoft.com/office/drawing/2014/main" id="{B4C41667-93B9-0958-ADDE-461A0AA7F69E}"/>
+              </a:ext>
+            </a:extLst>
+          </p:cNvPr>
+          <p:cNvPicPr>
+            <a:picLocks noChangeAspect="1"/>
+          </p:cNvPicPr>
+          <p:nvPr/>
+        </p:nvPicPr>
+        <p:blipFill>
+          <a:blip r:embed="rId2"/>
+          <a:stretch>
+            <a:fillRect/>
+          </a:stretch>
+        </p:blipFill>
+        <p:spPr>
+          <a:xfrm>
+            <a:off x="5434655" y="2900516"/>
+            <a:ext cx="5415827" cy="1781523"/>
+          </a:xfrm>
+          <a:prstGeom prst="rect">
+            <a:avLst/>
+          </a:prstGeom>
+        </p:spPr>
+      </p:pic>
+    </p:spTree>
+    <p:extLst>
+      <p:ext uri="{BB962C8B-B14F-4D97-AF65-F5344CB8AC3E}">
+        <p14:creationId xmlns:p14="http://schemas.microsoft.com/office/powerpoint/2010/main" val="6001133"/>
+      </p:ext>
+    </p:extLst>
+  </p:cSld>
+  <p:clrMapOvr>
+    <a:masterClrMapping/>
+  </p:clrMapOvr>
+  <mc:AlternateContent xmlns:mc="http://schemas.openxmlformats.org/markup-compatibility/2006">
+    <mc:Choice xmlns:p159="http://schemas.microsoft.com/office/powerpoint/2015/09/main" Requires="p159">
+      <p:transition xmlns:p14="http://schemas.microsoft.com/office/powerpoint/2010/main" spd="slow" p14:dur="2000">
+        <p159:morph option="byObject"/>
+      </p:transition>
+    </mc:Choice>
+    <mc:Fallback>
+      <p:transition spd="slow">
+        <p:fade/>
+      </p:transition>
+    </mc:Fallback>
+  </mc:AlternateContent>
+</p:sld>
+</file>
+
+<file path=ppt/slides/slide5.xml><?xml version="1.0" encoding="utf-8"?>
+<p:sld xmlns:a="http://schemas.openxmlformats.org/drawingml/2006/main" xmlns:r="http://schemas.openxmlformats.org/officeDocument/2006/relationships" xmlns:p="http://schemas.openxmlformats.org/presentationml/2006/main">
+  <p:cSld>
+    <p:spTree>
+      <p:nvGrpSpPr>
+        <p:cNvPr id="1" name=""/>
+        <p:cNvGrpSpPr/>
+        <p:nvPr/>
+      </p:nvGrpSpPr>
+      <p:grpSpPr>
+        <a:xfrm>
+          <a:off x="0" y="0"/>
+          <a:ext cx="0" cy="0"/>
+          <a:chOff x="0" y="0"/>
+          <a:chExt cx="0" cy="0"/>
+        </a:xfrm>
+      </p:grpSpPr>
+      <p:sp>
+        <p:nvSpPr>
+          <p:cNvPr id="2" name="Titre 1">
+            <a:extLst>
+              <a:ext uri="{FF2B5EF4-FFF2-40B4-BE49-F238E27FC236}">
+                <a16:creationId xmlns:a16="http://schemas.microsoft.com/office/drawing/2014/main" id="{45A0A26D-77E7-129E-F226-2211E5152F54}"/>
+              </a:ext>
+            </a:extLst>
+          </p:cNvPr>
+          <p:cNvSpPr>
+            <a:spLocks noGrp="1"/>
+          </p:cNvSpPr>
+          <p:nvPr>
+            <p:ph type="title"/>
+          </p:nvPr>
+        </p:nvSpPr>
+        <p:spPr/>
+        <p:txBody>
+          <a:bodyPr/>
+          <a:lstStyle/>
+          <a:p>
+            <a:r>
+              <a:rPr lang="fr-FR" b="1" dirty="0"/>
+              <a:t>PostgreSQL – La base de données</a:t>
+            </a:r>
+            <a:br>
+              <a:rPr lang="fr-FR" b="1" dirty="0"/>
+            </a:br>
+            <a:endParaRPr lang="fr-FR" dirty="0"/>
+          </a:p>
+        </p:txBody>
+      </p:sp>
+      <p:sp>
+        <p:nvSpPr>
+          <p:cNvPr id="4" name="Espace réservé du texte 3">
+            <a:extLst>
+              <a:ext uri="{FF2B5EF4-FFF2-40B4-BE49-F238E27FC236}">
+                <a16:creationId xmlns:a16="http://schemas.microsoft.com/office/drawing/2014/main" id="{E51E2F06-FB1B-4FE9-FE5C-B466805E6BE7}"/>
+              </a:ext>
+            </a:extLst>
+          </p:cNvPr>
+          <p:cNvSpPr>
+            <a:spLocks noGrp="1"/>
+          </p:cNvSpPr>
+          <p:nvPr>
+            <p:ph type="body" sz="half" idx="2"/>
+          </p:nvPr>
+        </p:nvSpPr>
+        <p:spPr/>
+        <p:txBody>
+          <a:bodyPr>
+            <a:normAutofit fontScale="70000" lnSpcReduction="20000"/>
+          </a:bodyPr>
+          <a:lstStyle/>
+          <a:p>
+            <a:endParaRPr lang="fr-FR" b="1" dirty="0"/>
+          </a:p>
+          <a:p>
+            <a:pPr>
+              <a:buFont typeface="Arial" panose="020B0604020202020204" pitchFamily="34" charset="0"/>
+              <a:buChar char="•"/>
+            </a:pPr>
+            <a:r>
+              <a:rPr lang="fr-FR" sz="2600" b="1" dirty="0"/>
+              <a:t>Rôle</a:t>
+            </a:r>
+            <a:r>
+              <a:rPr lang="fr-FR" dirty="0"/>
+              <a:t> : </a:t>
+            </a:r>
+            <a:r>
+              <a:rPr lang="fr-FR" sz="2100" dirty="0"/>
+              <a:t>stockage pérenne de toutes les informations</a:t>
+            </a:r>
+          </a:p>
+          <a:p>
+            <a:endParaRPr lang="fr-FR" dirty="0"/>
+          </a:p>
+          <a:p>
+            <a:pPr>
+              <a:buFont typeface="Arial" panose="020B0604020202020204" pitchFamily="34" charset="0"/>
+              <a:buChar char="•"/>
+            </a:pPr>
+            <a:r>
+              <a:rPr lang="fr-FR" sz="2600" b="1" dirty="0"/>
+              <a:t>Contenu</a:t>
+            </a:r>
+            <a:r>
+              <a:rPr lang="fr-FR" sz="2600" dirty="0"/>
+              <a:t> :</a:t>
+            </a:r>
+          </a:p>
+          <a:p>
+            <a:pPr marL="742950" lvl="1" indent="-285750">
+              <a:buFont typeface="Arial" panose="020B0604020202020204" pitchFamily="34" charset="0"/>
+              <a:buChar char="•"/>
+            </a:pPr>
+            <a:r>
+              <a:rPr lang="fr-FR" sz="2100" dirty="0"/>
+              <a:t>Comptes utilisateurs, profils et permissions</a:t>
+            </a:r>
+          </a:p>
+          <a:p>
+            <a:pPr marL="742950" lvl="1" indent="-285750">
+              <a:buFont typeface="Arial" panose="020B0604020202020204" pitchFamily="34" charset="0"/>
+              <a:buChar char="•"/>
+            </a:pPr>
+            <a:r>
+              <a:rPr lang="fr-FR" sz="2100" dirty="0"/>
+              <a:t>Messages échangés</a:t>
+            </a:r>
+          </a:p>
+          <a:p>
+            <a:pPr marL="742950" lvl="1" indent="-285750">
+              <a:buFont typeface="Arial" panose="020B0604020202020204" pitchFamily="34" charset="0"/>
+              <a:buChar char="•"/>
+            </a:pPr>
+            <a:r>
+              <a:rPr lang="fr-FR" sz="2100" dirty="0"/>
+              <a:t>Événements de calendrier (rendez-vous)</a:t>
+            </a:r>
+          </a:p>
+          <a:p>
+            <a:pPr marL="742950" lvl="1" indent="-285750">
+              <a:buFont typeface="Arial" panose="020B0604020202020204" pitchFamily="34" charset="0"/>
+              <a:buChar char="•"/>
+            </a:pPr>
+            <a:r>
+              <a:rPr lang="fr-FR" sz="2100" dirty="0"/>
+              <a:t>Tâches et rappels</a:t>
+            </a:r>
+          </a:p>
+          <a:p>
+            <a:pPr lvl="1"/>
+            <a:endParaRPr lang="fr-FR" dirty="0"/>
+          </a:p>
+          <a:p>
+            <a:pPr>
+              <a:buFont typeface="Arial" panose="020B0604020202020204" pitchFamily="34" charset="0"/>
+              <a:buChar char="•"/>
+            </a:pPr>
+            <a:r>
+              <a:rPr lang="fr-FR" sz="2600" b="1" dirty="0"/>
+              <a:t>Pourquoi PostgreSQL ?</a:t>
+            </a:r>
+            <a:endParaRPr lang="fr-FR" sz="2600" dirty="0"/>
+          </a:p>
+          <a:p>
+            <a:pPr marL="742950" lvl="1" indent="-285750">
+              <a:buFont typeface="Arial" panose="020B0604020202020204" pitchFamily="34" charset="0"/>
+              <a:buChar char="•"/>
+            </a:pPr>
+            <a:r>
+              <a:rPr lang="fr-FR" sz="1900" dirty="0"/>
+              <a:t>SGBD relationnel robuste et éprouvé en production</a:t>
+            </a:r>
+          </a:p>
+          <a:p>
+            <a:pPr marL="742950" lvl="1" indent="-285750">
+              <a:buFont typeface="Arial" panose="020B0604020202020204" pitchFamily="34" charset="0"/>
+              <a:buChar char="•"/>
+            </a:pPr>
+            <a:r>
+              <a:rPr lang="fr-FR" sz="1900" dirty="0"/>
+              <a:t>Excellente intégration avec Django (ORM puissant, migrations automatiques)</a:t>
+            </a:r>
+          </a:p>
+          <a:p>
+            <a:endParaRPr lang="fr-FR" dirty="0"/>
+          </a:p>
+        </p:txBody>
+      </p:sp>
+      <p:pic>
+        <p:nvPicPr>
+          <p:cNvPr id="6" name="Image 5">
+            <a:extLst>
+              <a:ext uri="{FF2B5EF4-FFF2-40B4-BE49-F238E27FC236}">
+                <a16:creationId xmlns:a16="http://schemas.microsoft.com/office/drawing/2014/main" id="{C2A6AAB5-1BA9-696A-7863-DB768CBAC9E9}"/>
+              </a:ext>
+            </a:extLst>
+          </p:cNvPr>
+          <p:cNvPicPr>
+            <a:picLocks noChangeAspect="1"/>
+          </p:cNvPicPr>
+          <p:nvPr/>
+        </p:nvPicPr>
+        <p:blipFill>
+          <a:blip r:embed="rId2"/>
+          <a:stretch>
+            <a:fillRect/>
+          </a:stretch>
+        </p:blipFill>
+        <p:spPr>
+          <a:xfrm>
+            <a:off x="6305195" y="2470431"/>
+            <a:ext cx="4323475" cy="1917138"/>
+          </a:xfrm>
+          <a:prstGeom prst="rect">
+            <a:avLst/>
+          </a:prstGeom>
+        </p:spPr>
+      </p:pic>
+    </p:spTree>
+    <p:extLst>
+      <p:ext uri="{BB962C8B-B14F-4D97-AF65-F5344CB8AC3E}">
+        <p14:creationId xmlns:p14="http://schemas.microsoft.com/office/powerpoint/2010/main" val="3289761411"/>
+      </p:ext>
+    </p:extLst>
+  </p:cSld>
+  <p:clrMapOvr>
+    <a:masterClrMapping/>
+  </p:clrMapOvr>
+  <mc:AlternateContent xmlns:mc="http://schemas.openxmlformats.org/markup-compatibility/2006">
+    <mc:Choice xmlns:p159="http://schemas.microsoft.com/office/powerpoint/2015/09/main" Requires="p159">
+      <p:transition xmlns:p14="http://schemas.microsoft.com/office/powerpoint/2010/main" spd="slow" p14:dur="2000">
+        <p159:morph option="byObject"/>
+      </p:transition>
+    </mc:Choice>
+    <mc:Fallback>
+      <p:transition spd="slow">
+        <p:fade/>
+      </p:transition>
+    </mc:Fallback>
+  </mc:AlternateContent>
 </p:sld>
 </file>
 

</xml_diff>